<commit_message>
Added slide to the fCal calibration tutorial about imaging parameters setting
git-svn-id: https://subversion.assembla.com/svn/plus/trunk/doc@2414 c04e96f8-ac36-4ff2-8b34-4a5e34ef045f
</commit_message>
<xml_diff>
--- a/tutorials/PlusTutorialfCalCalibrationProcess_UpdatedDec2012.pptx
+++ b/tutorials/PlusTutorialfCalCalibrationProcess_UpdatedDec2012.pptx
@@ -5,7 +5,7 @@
     <p:sldMasterId id="2147483648" r:id="rId1"/>
   </p:sldMasterIdLst>
   <p:notesMasterIdLst>
-    <p:notesMasterId r:id="rId16"/>
+    <p:notesMasterId r:id="rId17"/>
   </p:notesMasterIdLst>
   <p:sldIdLst>
     <p:sldId id="263" r:id="rId2"/>
@@ -21,7 +21,8 @@
     <p:sldId id="270" r:id="rId12"/>
     <p:sldId id="271" r:id="rId13"/>
     <p:sldId id="273" r:id="rId14"/>
-    <p:sldId id="274" r:id="rId15"/>
+    <p:sldId id="275" r:id="rId15"/>
+    <p:sldId id="274" r:id="rId16"/>
   </p:sldIdLst>
   <p:sldSz cx="9144000" cy="6858000" type="screen4x3"/>
   <p:notesSz cx="6858000" cy="9144000"/>
@@ -206,7 +207,7 @@
             <a:fld id="{08AE2C8F-80C9-49EC-8D3E-1E16295FA588}" type="datetimeFigureOut">
               <a:rPr lang="en-US" smtClean="0"/>
               <a:pPr/>
-              <a:t>12/12/2012</a:t>
+              <a:t>1/23/2013</a:t>
             </a:fld>
             <a:endParaRPr lang="en-US"/>
           </a:p>
@@ -6777,6 +6778,1040 @@
       </p:grpSpPr>
       <p:sp>
         <p:nvSpPr>
+          <p:cNvPr id="55" name="Rectangle 54"/>
+          <p:cNvSpPr/>
+          <p:nvPr/>
+        </p:nvSpPr>
+        <p:spPr>
+          <a:xfrm>
+            <a:off x="0" y="1135084"/>
+            <a:ext cx="9144000" cy="5178860"/>
+          </a:xfrm>
+          <a:prstGeom prst="rect">
+            <a:avLst/>
+          </a:prstGeom>
+          <a:solidFill>
+            <a:schemeClr val="tx1">
+              <a:lumMod val="65000"/>
+              <a:lumOff val="35000"/>
+            </a:schemeClr>
+          </a:solidFill>
+          <a:ln>
+            <a:noFill/>
+          </a:ln>
+        </p:spPr>
+        <p:style>
+          <a:lnRef idx="2">
+            <a:schemeClr val="accent1">
+              <a:shade val="50000"/>
+            </a:schemeClr>
+          </a:lnRef>
+          <a:fillRef idx="1">
+            <a:schemeClr val="accent1"/>
+          </a:fillRef>
+          <a:effectRef idx="0">
+            <a:schemeClr val="accent1"/>
+          </a:effectRef>
+          <a:fontRef idx="minor">
+            <a:schemeClr val="lt1"/>
+          </a:fontRef>
+        </p:style>
+        <p:txBody>
+          <a:bodyPr rtlCol="0" anchor="ctr"/>
+          <a:lstStyle/>
+          <a:p>
+            <a:pPr algn="ctr"/>
+            <a:endParaRPr lang="en-CA"/>
+          </a:p>
+        </p:txBody>
+      </p:sp>
+      <p:pic>
+        <p:nvPicPr>
+          <p:cNvPr id="1026" name="Picture 2" descr="C:\Users\lasso\SkyDrive\Projects\Plus\Bwh\2013-01-22\Screenshot.png"/>
+          <p:cNvPicPr>
+            <a:picLocks noChangeAspect="1" noChangeArrowheads="1"/>
+          </p:cNvPicPr>
+          <p:nvPr/>
+        </p:nvPicPr>
+        <p:blipFill>
+          <a:blip r:embed="rId2">
+            <a:extLst>
+              <a:ext uri="{28A0092B-C50C-407E-A947-70E740481C1C}">
+                <a14:useLocalDpi xmlns:a14="http://schemas.microsoft.com/office/drawing/2010/main" val="0"/>
+              </a:ext>
+            </a:extLst>
+          </a:blip>
+          <a:srcRect/>
+          <a:stretch>
+            <a:fillRect/>
+          </a:stretch>
+        </p:blipFill>
+        <p:spPr bwMode="auto">
+          <a:xfrm>
+            <a:off x="1295400" y="1135084"/>
+            <a:ext cx="6560820" cy="5178860"/>
+          </a:xfrm>
+          <a:prstGeom prst="rect">
+            <a:avLst/>
+          </a:prstGeom>
+          <a:noFill/>
+          <a:extLst>
+            <a:ext uri="{909E8E84-426E-40DD-AFC4-6F175D3DCCD1}">
+              <a14:hiddenFill xmlns:a14="http://schemas.microsoft.com/office/drawing/2010/main">
+                <a:solidFill>
+                  <a:srgbClr val="FFFFFF"/>
+                </a:solidFill>
+              </a14:hiddenFill>
+            </a:ext>
+          </a:extLst>
+        </p:spPr>
+      </p:pic>
+      <p:sp>
+        <p:nvSpPr>
+          <p:cNvPr id="2" name="Title 1"/>
+          <p:cNvSpPr>
+            <a:spLocks noGrp="1"/>
+          </p:cNvSpPr>
+          <p:nvPr>
+            <p:ph type="title"/>
+          </p:nvPr>
+        </p:nvSpPr>
+        <p:spPr/>
+        <p:txBody>
+          <a:bodyPr/>
+          <a:lstStyle/>
+          <a:p>
+            <a:r>
+              <a:rPr lang="en-US" dirty="0" smtClean="0"/>
+              <a:t>Spatial calibration</a:t>
+            </a:r>
+            <a:endParaRPr lang="en-US" dirty="0"/>
+          </a:p>
+        </p:txBody>
+      </p:sp>
+      <p:sp>
+        <p:nvSpPr>
+          <p:cNvPr id="4" name="Footer Placeholder 3"/>
+          <p:cNvSpPr>
+            <a:spLocks noGrp="1"/>
+          </p:cNvSpPr>
+          <p:nvPr>
+            <p:ph type="ftr" sz="quarter" idx="11"/>
+          </p:nvPr>
+        </p:nvSpPr>
+        <p:spPr/>
+        <p:txBody>
+          <a:bodyPr/>
+          <a:lstStyle/>
+          <a:p>
+            <a:r>
+              <a:rPr lang="en-US" dirty="0" smtClean="0"/>
+              <a:t>Laboratory for Percutaneous Surgery (The Perk Lab) – Copyright © Queen’s University, 2012</a:t>
+            </a:r>
+          </a:p>
+          <a:p>
+            <a:endParaRPr lang="en-US" dirty="0"/>
+          </a:p>
+        </p:txBody>
+      </p:sp>
+      <p:sp>
+        <p:nvSpPr>
+          <p:cNvPr id="19" name="Rectangle 18"/>
+          <p:cNvSpPr/>
+          <p:nvPr/>
+        </p:nvSpPr>
+        <p:spPr>
+          <a:xfrm>
+            <a:off x="6629400" y="3283910"/>
+            <a:ext cx="2286000" cy="2677656"/>
+          </a:xfrm>
+          <a:prstGeom prst="rect">
+            <a:avLst/>
+          </a:prstGeom>
+        </p:spPr>
+        <p:txBody>
+          <a:bodyPr wrap="square">
+            <a:spAutoFit/>
+          </a:bodyPr>
+          <a:lstStyle/>
+          <a:p>
+            <a:r>
+              <a:rPr lang="en-CA" sz="1400" dirty="0" smtClean="0">
+                <a:solidFill>
+                  <a:srgbClr val="FFC000"/>
+                </a:solidFill>
+              </a:rPr>
+              <a:t>Only the </a:t>
+            </a:r>
+            <a:r>
+              <a:rPr lang="en-CA" sz="1400" dirty="0" err="1" smtClean="0">
+                <a:solidFill>
+                  <a:srgbClr val="FFC000"/>
+                </a:solidFill>
+              </a:rPr>
+              <a:t>fiducials</a:t>
+            </a:r>
+            <a:r>
+              <a:rPr lang="en-CA" sz="1400" dirty="0" smtClean="0">
+                <a:solidFill>
+                  <a:srgbClr val="FFC000"/>
+                </a:solidFill>
+              </a:rPr>
+              <a:t> should be visible in the image, the background should be almost black.</a:t>
+            </a:r>
+          </a:p>
+          <a:p>
+            <a:endParaRPr lang="en-CA" sz="1400" dirty="0" smtClean="0">
+              <a:solidFill>
+                <a:srgbClr val="FFC000"/>
+              </a:solidFill>
+            </a:endParaRPr>
+          </a:p>
+          <a:p>
+            <a:r>
+              <a:rPr lang="en-CA" sz="1400" dirty="0" smtClean="0">
+                <a:solidFill>
+                  <a:srgbClr val="FFC000"/>
+                </a:solidFill>
+              </a:rPr>
+              <a:t>Background is OK here.</a:t>
+            </a:r>
+            <a:endParaRPr lang="en-CA" sz="1400" dirty="0">
+              <a:solidFill>
+                <a:srgbClr val="FFC000"/>
+              </a:solidFill>
+            </a:endParaRPr>
+          </a:p>
+          <a:p>
+            <a:endParaRPr lang="en-CA" sz="1400" dirty="0">
+              <a:solidFill>
+                <a:srgbClr val="FFC000"/>
+              </a:solidFill>
+            </a:endParaRPr>
+          </a:p>
+          <a:p>
+            <a:r>
+              <a:rPr lang="en-CA" sz="1400" dirty="0" smtClean="0">
+                <a:solidFill>
+                  <a:srgbClr val="FFC000"/>
+                </a:solidFill>
+              </a:rPr>
+              <a:t>Background is way too bright here. Decrease </a:t>
+            </a:r>
+            <a:r>
+              <a:rPr lang="en-CA" sz="1400" dirty="0">
+                <a:solidFill>
+                  <a:srgbClr val="FFC000"/>
+                </a:solidFill>
+              </a:rPr>
+              <a:t>the dynamic </a:t>
+            </a:r>
+            <a:r>
+              <a:rPr lang="en-CA" sz="1400" dirty="0" smtClean="0">
+                <a:solidFill>
+                  <a:srgbClr val="FFC000"/>
+                </a:solidFill>
+              </a:rPr>
+              <a:t>range, decrease gain, adjust TGCs, increase threshold to make the background darker.</a:t>
+            </a:r>
+            <a:endParaRPr lang="en-CA" sz="1400" dirty="0">
+              <a:solidFill>
+                <a:srgbClr val="FFC000"/>
+              </a:solidFill>
+            </a:endParaRPr>
+          </a:p>
+        </p:txBody>
+      </p:sp>
+      <p:sp>
+        <p:nvSpPr>
+          <p:cNvPr id="5" name="Rectangle 4"/>
+          <p:cNvSpPr/>
+          <p:nvPr/>
+        </p:nvSpPr>
+        <p:spPr>
+          <a:xfrm>
+            <a:off x="4876800" y="2437924"/>
+            <a:ext cx="2286000" cy="523220"/>
+          </a:xfrm>
+          <a:prstGeom prst="rect">
+            <a:avLst/>
+          </a:prstGeom>
+        </p:spPr>
+        <p:txBody>
+          <a:bodyPr wrap="square">
+            <a:spAutoFit/>
+          </a:bodyPr>
+          <a:lstStyle/>
+          <a:p>
+            <a:r>
+              <a:rPr lang="en-CA" sz="1400" dirty="0" smtClean="0">
+                <a:solidFill>
+                  <a:srgbClr val="FFC000"/>
+                </a:solidFill>
+              </a:rPr>
+              <a:t>This is way too big. Decrease the gain and dynamic range.</a:t>
+            </a:r>
+            <a:endParaRPr lang="en-CA" sz="1400" dirty="0"/>
+          </a:p>
+        </p:txBody>
+      </p:sp>
+      <p:sp>
+        <p:nvSpPr>
+          <p:cNvPr id="6" name="Oval 5"/>
+          <p:cNvSpPr/>
+          <p:nvPr/>
+        </p:nvSpPr>
+        <p:spPr>
+          <a:xfrm>
+            <a:off x="5334000" y="3723144"/>
+            <a:ext cx="457200" cy="457200"/>
+          </a:xfrm>
+          <a:prstGeom prst="ellipse">
+            <a:avLst/>
+          </a:prstGeom>
+          <a:noFill/>
+          <a:ln>
+            <a:solidFill>
+              <a:srgbClr val="FF0000"/>
+            </a:solidFill>
+          </a:ln>
+        </p:spPr>
+        <p:style>
+          <a:lnRef idx="2">
+            <a:schemeClr val="accent6">
+              <a:shade val="50000"/>
+            </a:schemeClr>
+          </a:lnRef>
+          <a:fillRef idx="1">
+            <a:schemeClr val="accent6"/>
+          </a:fillRef>
+          <a:effectRef idx="0">
+            <a:schemeClr val="accent6"/>
+          </a:effectRef>
+          <a:fontRef idx="minor">
+            <a:schemeClr val="lt1"/>
+          </a:fontRef>
+        </p:style>
+        <p:txBody>
+          <a:bodyPr rtlCol="0" anchor="ctr"/>
+          <a:lstStyle/>
+          <a:p>
+            <a:pPr algn="ctr"/>
+            <a:endParaRPr lang="en-CA"/>
+          </a:p>
+        </p:txBody>
+      </p:sp>
+      <p:cxnSp>
+        <p:nvCxnSpPr>
+          <p:cNvPr id="8" name="Straight Arrow Connector 7"/>
+          <p:cNvCxnSpPr/>
+          <p:nvPr/>
+        </p:nvCxnSpPr>
+        <p:spPr>
+          <a:xfrm>
+            <a:off x="3429000" y="2961144"/>
+            <a:ext cx="0" cy="304800"/>
+          </a:xfrm>
+          <a:prstGeom prst="straightConnector1">
+            <a:avLst/>
+          </a:prstGeom>
+          <a:ln>
+            <a:solidFill>
+              <a:srgbClr val="92D050"/>
+            </a:solidFill>
+            <a:tailEnd type="arrow"/>
+          </a:ln>
+        </p:spPr>
+        <p:style>
+          <a:lnRef idx="1">
+            <a:schemeClr val="accent1"/>
+          </a:lnRef>
+          <a:fillRef idx="0">
+            <a:schemeClr val="accent1"/>
+          </a:fillRef>
+          <a:effectRef idx="0">
+            <a:schemeClr val="accent1"/>
+          </a:effectRef>
+          <a:fontRef idx="minor">
+            <a:schemeClr val="tx1"/>
+          </a:fontRef>
+        </p:style>
+      </p:cxnSp>
+      <p:sp>
+        <p:nvSpPr>
+          <p:cNvPr id="24" name="Oval 23"/>
+          <p:cNvSpPr/>
+          <p:nvPr/>
+        </p:nvSpPr>
+        <p:spPr>
+          <a:xfrm>
+            <a:off x="3200400" y="3265944"/>
+            <a:ext cx="457200" cy="457200"/>
+          </a:xfrm>
+          <a:prstGeom prst="ellipse">
+            <a:avLst/>
+          </a:prstGeom>
+          <a:noFill/>
+          <a:ln>
+            <a:solidFill>
+              <a:srgbClr val="92D050"/>
+            </a:solidFill>
+          </a:ln>
+        </p:spPr>
+        <p:style>
+          <a:lnRef idx="2">
+            <a:schemeClr val="accent6">
+              <a:shade val="50000"/>
+            </a:schemeClr>
+          </a:lnRef>
+          <a:fillRef idx="1">
+            <a:schemeClr val="accent6"/>
+          </a:fillRef>
+          <a:effectRef idx="0">
+            <a:schemeClr val="accent6"/>
+          </a:effectRef>
+          <a:fontRef idx="minor">
+            <a:schemeClr val="lt1"/>
+          </a:fontRef>
+        </p:style>
+        <p:txBody>
+          <a:bodyPr rtlCol="0" anchor="ctr"/>
+          <a:lstStyle/>
+          <a:p>
+            <a:pPr algn="ctr"/>
+            <a:endParaRPr lang="en-CA"/>
+          </a:p>
+        </p:txBody>
+      </p:sp>
+      <p:sp>
+        <p:nvSpPr>
+          <p:cNvPr id="25" name="Rectangle 24"/>
+          <p:cNvSpPr/>
+          <p:nvPr/>
+        </p:nvSpPr>
+        <p:spPr>
+          <a:xfrm>
+            <a:off x="2667000" y="1884164"/>
+            <a:ext cx="4572000" cy="523220"/>
+          </a:xfrm>
+          <a:prstGeom prst="rect">
+            <a:avLst/>
+          </a:prstGeom>
+        </p:spPr>
+        <p:txBody>
+          <a:bodyPr>
+            <a:spAutoFit/>
+          </a:bodyPr>
+          <a:lstStyle/>
+          <a:p>
+            <a:r>
+              <a:rPr lang="en-CA" sz="1400" dirty="0" err="1" smtClean="0">
+                <a:solidFill>
+                  <a:srgbClr val="FFC000"/>
+                </a:solidFill>
+              </a:rPr>
+              <a:t>Fiducial</a:t>
+            </a:r>
+            <a:r>
+              <a:rPr lang="en-CA" sz="1400" dirty="0" smtClean="0">
+                <a:solidFill>
+                  <a:srgbClr val="FFC000"/>
+                </a:solidFill>
+              </a:rPr>
+              <a:t> </a:t>
+            </a:r>
+            <a:r>
+              <a:rPr lang="en-CA" sz="1400" dirty="0">
+                <a:solidFill>
+                  <a:srgbClr val="FFC000"/>
+                </a:solidFill>
+              </a:rPr>
+              <a:t>line intersection points should appear as small circular-shaped </a:t>
+            </a:r>
+            <a:r>
+              <a:rPr lang="en-CA" sz="1400" dirty="0" smtClean="0">
+                <a:solidFill>
+                  <a:srgbClr val="FFC000"/>
+                </a:solidFill>
+              </a:rPr>
+              <a:t>blobs.</a:t>
+            </a:r>
+          </a:p>
+        </p:txBody>
+      </p:sp>
+      <p:cxnSp>
+        <p:nvCxnSpPr>
+          <p:cNvPr id="26" name="Straight Arrow Connector 25"/>
+          <p:cNvCxnSpPr/>
+          <p:nvPr/>
+        </p:nvCxnSpPr>
+        <p:spPr>
+          <a:xfrm>
+            <a:off x="5562600" y="2961144"/>
+            <a:ext cx="0" cy="763370"/>
+          </a:xfrm>
+          <a:prstGeom prst="straightConnector1">
+            <a:avLst/>
+          </a:prstGeom>
+          <a:ln>
+            <a:solidFill>
+              <a:srgbClr val="FF0000"/>
+            </a:solidFill>
+            <a:tailEnd type="arrow"/>
+          </a:ln>
+        </p:spPr>
+        <p:style>
+          <a:lnRef idx="1">
+            <a:schemeClr val="accent1"/>
+          </a:lnRef>
+          <a:fillRef idx="0">
+            <a:schemeClr val="accent1"/>
+          </a:fillRef>
+          <a:effectRef idx="0">
+            <a:schemeClr val="accent1"/>
+          </a:effectRef>
+          <a:fontRef idx="minor">
+            <a:schemeClr val="tx1"/>
+          </a:fontRef>
+        </p:style>
+      </p:cxnSp>
+      <p:sp>
+        <p:nvSpPr>
+          <p:cNvPr id="28" name="Rectangle 27"/>
+          <p:cNvSpPr/>
+          <p:nvPr/>
+        </p:nvSpPr>
+        <p:spPr>
+          <a:xfrm>
+            <a:off x="2667000" y="2437924"/>
+            <a:ext cx="2209800" cy="523220"/>
+          </a:xfrm>
+          <a:prstGeom prst="rect">
+            <a:avLst/>
+          </a:prstGeom>
+        </p:spPr>
+        <p:txBody>
+          <a:bodyPr wrap="square">
+            <a:spAutoFit/>
+          </a:bodyPr>
+          <a:lstStyle/>
+          <a:p>
+            <a:r>
+              <a:rPr lang="en-CA" sz="1400" dirty="0" smtClean="0">
+                <a:solidFill>
+                  <a:srgbClr val="FFC000"/>
+                </a:solidFill>
+              </a:rPr>
+              <a:t>This is about OK size, but could be even smaller.</a:t>
+            </a:r>
+            <a:endParaRPr lang="en-CA" sz="1400" dirty="0"/>
+          </a:p>
+        </p:txBody>
+      </p:sp>
+      <p:sp>
+        <p:nvSpPr>
+          <p:cNvPr id="32" name="Rectangle 31"/>
+          <p:cNvSpPr/>
+          <p:nvPr/>
+        </p:nvSpPr>
+        <p:spPr>
+          <a:xfrm>
+            <a:off x="152400" y="3657600"/>
+            <a:ext cx="2133163" cy="2677656"/>
+          </a:xfrm>
+          <a:prstGeom prst="rect">
+            <a:avLst/>
+          </a:prstGeom>
+        </p:spPr>
+        <p:txBody>
+          <a:bodyPr wrap="square">
+            <a:spAutoFit/>
+          </a:bodyPr>
+          <a:lstStyle/>
+          <a:p>
+            <a:r>
+              <a:rPr lang="en-CA" sz="1400" dirty="0" smtClean="0">
+                <a:solidFill>
+                  <a:srgbClr val="FFC000"/>
+                </a:solidFill>
+              </a:rPr>
+              <a:t>Reduce </a:t>
+            </a:r>
+            <a:r>
+              <a:rPr lang="en-CA" sz="1400" dirty="0">
+                <a:solidFill>
+                  <a:srgbClr val="FFC000"/>
+                </a:solidFill>
+              </a:rPr>
+              <a:t>reflections by slightly changing the transducer angle or putting sound absorbing material in the water container (such as rubber or sponge). </a:t>
+            </a:r>
+            <a:endParaRPr lang="en-CA" sz="1400" dirty="0" smtClean="0">
+              <a:solidFill>
+                <a:srgbClr val="FFC000"/>
+              </a:solidFill>
+            </a:endParaRPr>
+          </a:p>
+          <a:p>
+            <a:endParaRPr lang="en-CA" sz="1400" dirty="0">
+              <a:solidFill>
+                <a:srgbClr val="FFC000"/>
+              </a:solidFill>
+            </a:endParaRPr>
+          </a:p>
+          <a:p>
+            <a:r>
+              <a:rPr lang="en-CA" sz="1400" dirty="0" smtClean="0">
+                <a:solidFill>
+                  <a:srgbClr val="FFC000"/>
+                </a:solidFill>
+              </a:rPr>
+              <a:t>There is a strong reflection from here that brightens up a large section of the image.</a:t>
+            </a:r>
+            <a:endParaRPr lang="en-CA" sz="1400" dirty="0">
+              <a:solidFill>
+                <a:srgbClr val="FFC000"/>
+              </a:solidFill>
+            </a:endParaRPr>
+          </a:p>
+        </p:txBody>
+      </p:sp>
+      <p:cxnSp>
+        <p:nvCxnSpPr>
+          <p:cNvPr id="33" name="Straight Arrow Connector 32"/>
+          <p:cNvCxnSpPr>
+            <a:endCxn id="34" idx="6"/>
+          </p:cNvCxnSpPr>
+          <p:nvPr/>
+        </p:nvCxnSpPr>
+        <p:spPr>
+          <a:xfrm flipH="1" flipV="1">
+            <a:off x="4167554" y="3157506"/>
+            <a:ext cx="373966" cy="91813"/>
+          </a:xfrm>
+          <a:prstGeom prst="straightConnector1">
+            <a:avLst/>
+          </a:prstGeom>
+          <a:ln>
+            <a:solidFill>
+              <a:srgbClr val="92D050"/>
+            </a:solidFill>
+            <a:tailEnd type="arrow"/>
+          </a:ln>
+        </p:spPr>
+        <p:style>
+          <a:lnRef idx="1">
+            <a:schemeClr val="accent1"/>
+          </a:lnRef>
+          <a:fillRef idx="0">
+            <a:schemeClr val="accent1"/>
+          </a:fillRef>
+          <a:effectRef idx="0">
+            <a:schemeClr val="accent1"/>
+          </a:effectRef>
+          <a:fontRef idx="minor">
+            <a:schemeClr val="tx1"/>
+          </a:fontRef>
+        </p:style>
+      </p:cxnSp>
+      <p:sp>
+        <p:nvSpPr>
+          <p:cNvPr id="34" name="Oval 33"/>
+          <p:cNvSpPr/>
+          <p:nvPr/>
+        </p:nvSpPr>
+        <p:spPr>
+          <a:xfrm>
+            <a:off x="3821723" y="2984590"/>
+            <a:ext cx="345831" cy="345831"/>
+          </a:xfrm>
+          <a:prstGeom prst="ellipse">
+            <a:avLst/>
+          </a:prstGeom>
+          <a:noFill/>
+          <a:ln>
+            <a:solidFill>
+              <a:srgbClr val="92D050"/>
+            </a:solidFill>
+          </a:ln>
+        </p:spPr>
+        <p:style>
+          <a:lnRef idx="2">
+            <a:schemeClr val="accent6">
+              <a:shade val="50000"/>
+            </a:schemeClr>
+          </a:lnRef>
+          <a:fillRef idx="1">
+            <a:schemeClr val="accent6"/>
+          </a:fillRef>
+          <a:effectRef idx="0">
+            <a:schemeClr val="accent6"/>
+          </a:effectRef>
+          <a:fontRef idx="minor">
+            <a:schemeClr val="lt1"/>
+          </a:fontRef>
+        </p:style>
+        <p:txBody>
+          <a:bodyPr rtlCol="0" anchor="ctr"/>
+          <a:lstStyle/>
+          <a:p>
+            <a:pPr algn="ctr"/>
+            <a:endParaRPr lang="en-CA"/>
+          </a:p>
+        </p:txBody>
+      </p:sp>
+      <p:sp>
+        <p:nvSpPr>
+          <p:cNvPr id="37" name="Rectangle 36"/>
+          <p:cNvSpPr/>
+          <p:nvPr/>
+        </p:nvSpPr>
+        <p:spPr>
+          <a:xfrm>
+            <a:off x="4518660" y="3101340"/>
+            <a:ext cx="868680" cy="738664"/>
+          </a:xfrm>
+          <a:prstGeom prst="rect">
+            <a:avLst/>
+          </a:prstGeom>
+        </p:spPr>
+        <p:txBody>
+          <a:bodyPr wrap="square">
+            <a:spAutoFit/>
+          </a:bodyPr>
+          <a:lstStyle/>
+          <a:p>
+            <a:r>
+              <a:rPr lang="en-CA" sz="1400" dirty="0" smtClean="0">
+                <a:solidFill>
+                  <a:srgbClr val="FFC000"/>
+                </a:solidFill>
+              </a:rPr>
+              <a:t>Good </a:t>
+            </a:r>
+            <a:r>
+              <a:rPr lang="en-CA" sz="1400" dirty="0" err="1" smtClean="0">
+                <a:solidFill>
+                  <a:srgbClr val="FFC000"/>
+                </a:solidFill>
+              </a:rPr>
+              <a:t>fiducial</a:t>
+            </a:r>
+            <a:r>
+              <a:rPr lang="en-CA" sz="1400" dirty="0" smtClean="0">
+                <a:solidFill>
+                  <a:srgbClr val="FFC000"/>
+                </a:solidFill>
+              </a:rPr>
+              <a:t> size</a:t>
+            </a:r>
+            <a:endParaRPr lang="en-CA" sz="1400" dirty="0"/>
+          </a:p>
+        </p:txBody>
+      </p:sp>
+      <p:cxnSp>
+        <p:nvCxnSpPr>
+          <p:cNvPr id="40" name="Straight Arrow Connector 39"/>
+          <p:cNvCxnSpPr/>
+          <p:nvPr/>
+        </p:nvCxnSpPr>
+        <p:spPr>
+          <a:xfrm flipH="1" flipV="1">
+            <a:off x="6195646" y="3878521"/>
+            <a:ext cx="433754" cy="592793"/>
+          </a:xfrm>
+          <a:prstGeom prst="straightConnector1">
+            <a:avLst/>
+          </a:prstGeom>
+          <a:ln>
+            <a:solidFill>
+              <a:srgbClr val="92D050"/>
+            </a:solidFill>
+            <a:tailEnd type="arrow"/>
+          </a:ln>
+        </p:spPr>
+        <p:style>
+          <a:lnRef idx="1">
+            <a:schemeClr val="accent1"/>
+          </a:lnRef>
+          <a:fillRef idx="0">
+            <a:schemeClr val="accent1"/>
+          </a:fillRef>
+          <a:effectRef idx="0">
+            <a:schemeClr val="accent1"/>
+          </a:effectRef>
+          <a:fontRef idx="minor">
+            <a:schemeClr val="tx1"/>
+          </a:fontRef>
+        </p:style>
+      </p:cxnSp>
+      <p:cxnSp>
+        <p:nvCxnSpPr>
+          <p:cNvPr id="41" name="Straight Arrow Connector 40"/>
+          <p:cNvCxnSpPr/>
+          <p:nvPr/>
+        </p:nvCxnSpPr>
+        <p:spPr>
+          <a:xfrm flipH="1" flipV="1">
+            <a:off x="5791200" y="4713744"/>
+            <a:ext cx="808892" cy="484452"/>
+          </a:xfrm>
+          <a:prstGeom prst="straightConnector1">
+            <a:avLst/>
+          </a:prstGeom>
+          <a:ln>
+            <a:solidFill>
+              <a:srgbClr val="FF0000"/>
+            </a:solidFill>
+            <a:tailEnd type="arrow"/>
+          </a:ln>
+        </p:spPr>
+        <p:style>
+          <a:lnRef idx="1">
+            <a:schemeClr val="accent1"/>
+          </a:lnRef>
+          <a:fillRef idx="0">
+            <a:schemeClr val="accent1"/>
+          </a:fillRef>
+          <a:effectRef idx="0">
+            <a:schemeClr val="accent1"/>
+          </a:effectRef>
+          <a:fontRef idx="minor">
+            <a:schemeClr val="tx1"/>
+          </a:fontRef>
+        </p:style>
+      </p:cxnSp>
+      <p:cxnSp>
+        <p:nvCxnSpPr>
+          <p:cNvPr id="36" name="Straight Connector 35"/>
+          <p:cNvCxnSpPr/>
+          <p:nvPr/>
+        </p:nvCxnSpPr>
+        <p:spPr>
+          <a:xfrm>
+            <a:off x="685800" y="2896667"/>
+            <a:ext cx="5943600" cy="1245989"/>
+          </a:xfrm>
+          <a:prstGeom prst="line">
+            <a:avLst/>
+          </a:prstGeom>
+          <a:ln>
+            <a:solidFill>
+              <a:srgbClr val="FF0000"/>
+            </a:solidFill>
+            <a:prstDash val="dash"/>
+          </a:ln>
+        </p:spPr>
+        <p:style>
+          <a:lnRef idx="1">
+            <a:schemeClr val="accent1"/>
+          </a:lnRef>
+          <a:fillRef idx="0">
+            <a:schemeClr val="accent1"/>
+          </a:fillRef>
+          <a:effectRef idx="0">
+            <a:schemeClr val="accent1"/>
+          </a:effectRef>
+          <a:fontRef idx="minor">
+            <a:schemeClr val="tx1"/>
+          </a:fontRef>
+        </p:style>
+      </p:cxnSp>
+      <p:sp>
+        <p:nvSpPr>
+          <p:cNvPr id="46" name="Rectangle 45"/>
+          <p:cNvSpPr/>
+          <p:nvPr/>
+        </p:nvSpPr>
+        <p:spPr>
+          <a:xfrm>
+            <a:off x="114300" y="1284744"/>
+            <a:ext cx="2362200" cy="1600438"/>
+          </a:xfrm>
+          <a:prstGeom prst="rect">
+            <a:avLst/>
+          </a:prstGeom>
+        </p:spPr>
+        <p:txBody>
+          <a:bodyPr wrap="square">
+            <a:spAutoFit/>
+          </a:bodyPr>
+          <a:lstStyle/>
+          <a:p>
+            <a:r>
+              <a:rPr lang="en-CA" sz="1400" dirty="0">
+                <a:solidFill>
+                  <a:srgbClr val="FFC000"/>
+                </a:solidFill>
+              </a:rPr>
+              <a:t>Keep the transducer's axial (direction of sound travel) axis orthogonal to the wires for optimal reflection from the wires</a:t>
+            </a:r>
+            <a:r>
+              <a:rPr lang="en-CA" sz="1400" dirty="0" smtClean="0">
+                <a:solidFill>
+                  <a:srgbClr val="FFC000"/>
+                </a:solidFill>
+              </a:rPr>
+              <a:t>. This dotted line should be approximately horizontal.</a:t>
+            </a:r>
+            <a:endParaRPr lang="en-CA" sz="1400" dirty="0">
+              <a:solidFill>
+                <a:srgbClr val="FFC000"/>
+              </a:solidFill>
+            </a:endParaRPr>
+          </a:p>
+        </p:txBody>
+      </p:sp>
+      <p:sp>
+        <p:nvSpPr>
+          <p:cNvPr id="50" name="Oval 49"/>
+          <p:cNvSpPr/>
+          <p:nvPr/>
+        </p:nvSpPr>
+        <p:spPr>
+          <a:xfrm rot="925254">
+            <a:off x="2570868" y="5627052"/>
+            <a:ext cx="1199945" cy="457200"/>
+          </a:xfrm>
+          <a:prstGeom prst="ellipse">
+            <a:avLst/>
+          </a:prstGeom>
+          <a:noFill/>
+          <a:ln>
+            <a:solidFill>
+              <a:srgbClr val="FF0000"/>
+            </a:solidFill>
+          </a:ln>
+        </p:spPr>
+        <p:style>
+          <a:lnRef idx="2">
+            <a:schemeClr val="accent6">
+              <a:shade val="50000"/>
+            </a:schemeClr>
+          </a:lnRef>
+          <a:fillRef idx="1">
+            <a:schemeClr val="accent6"/>
+          </a:fillRef>
+          <a:effectRef idx="0">
+            <a:schemeClr val="accent6"/>
+          </a:effectRef>
+          <a:fontRef idx="minor">
+            <a:schemeClr val="lt1"/>
+          </a:fontRef>
+        </p:style>
+        <p:txBody>
+          <a:bodyPr rtlCol="0" anchor="ctr"/>
+          <a:lstStyle/>
+          <a:p>
+            <a:pPr algn="ctr"/>
+            <a:endParaRPr lang="en-CA"/>
+          </a:p>
+        </p:txBody>
+      </p:sp>
+      <p:cxnSp>
+        <p:nvCxnSpPr>
+          <p:cNvPr id="51" name="Straight Arrow Connector 50"/>
+          <p:cNvCxnSpPr/>
+          <p:nvPr/>
+        </p:nvCxnSpPr>
+        <p:spPr>
+          <a:xfrm flipV="1">
+            <a:off x="3162300" y="4331067"/>
+            <a:ext cx="832338" cy="1525678"/>
+          </a:xfrm>
+          <a:prstGeom prst="straightConnector1">
+            <a:avLst/>
+          </a:prstGeom>
+          <a:ln w="38100">
+            <a:solidFill>
+              <a:srgbClr val="FF0000"/>
+            </a:solidFill>
+            <a:prstDash val="sysDot"/>
+            <a:tailEnd type="arrow"/>
+          </a:ln>
+        </p:spPr>
+        <p:style>
+          <a:lnRef idx="1">
+            <a:schemeClr val="accent1"/>
+          </a:lnRef>
+          <a:fillRef idx="0">
+            <a:schemeClr val="accent1"/>
+          </a:fillRef>
+          <a:effectRef idx="0">
+            <a:schemeClr val="accent1"/>
+          </a:effectRef>
+          <a:fontRef idx="minor">
+            <a:schemeClr val="tx1"/>
+          </a:fontRef>
+        </p:style>
+      </p:cxnSp>
+      <p:cxnSp>
+        <p:nvCxnSpPr>
+          <p:cNvPr id="53" name="Straight Arrow Connector 52"/>
+          <p:cNvCxnSpPr/>
+          <p:nvPr/>
+        </p:nvCxnSpPr>
+        <p:spPr>
+          <a:xfrm>
+            <a:off x="2209800" y="5884328"/>
+            <a:ext cx="321881" cy="0"/>
+          </a:xfrm>
+          <a:prstGeom prst="straightConnector1">
+            <a:avLst/>
+          </a:prstGeom>
+          <a:ln>
+            <a:solidFill>
+              <a:srgbClr val="FF0000"/>
+            </a:solidFill>
+            <a:tailEnd type="arrow"/>
+          </a:ln>
+        </p:spPr>
+        <p:style>
+          <a:lnRef idx="1">
+            <a:schemeClr val="accent1"/>
+          </a:lnRef>
+          <a:fillRef idx="0">
+            <a:schemeClr val="accent1"/>
+          </a:fillRef>
+          <a:effectRef idx="0">
+            <a:schemeClr val="accent1"/>
+          </a:effectRef>
+          <a:fontRef idx="minor">
+            <a:schemeClr val="tx1"/>
+          </a:fontRef>
+        </p:style>
+      </p:cxnSp>
+    </p:spTree>
+    <p:extLst>
+      <p:ext uri="{BB962C8B-B14F-4D97-AF65-F5344CB8AC3E}">
+        <p14:creationId xmlns:p14="http://schemas.microsoft.com/office/powerpoint/2010/main" val="3152212490"/>
+      </p:ext>
+    </p:extLst>
+  </p:cSld>
+  <p:clrMapOvr>
+    <a:masterClrMapping/>
+  </p:clrMapOvr>
+</p:sld>
+</file>
+
+<file path=ppt/slides/slide15.xml><?xml version="1.0" encoding="utf-8"?>
+<p:sld xmlns:a="http://schemas.openxmlformats.org/drawingml/2006/main" xmlns:r="http://schemas.openxmlformats.org/officeDocument/2006/relationships" xmlns:p="http://schemas.openxmlformats.org/presentationml/2006/main">
+  <p:cSld>
+    <p:spTree>
+      <p:nvGrpSpPr>
+        <p:cNvPr id="1" name=""/>
+        <p:cNvGrpSpPr/>
+        <p:nvPr/>
+      </p:nvGrpSpPr>
+      <p:grpSpPr>
+        <a:xfrm>
+          <a:off x="0" y="0"/>
+          <a:ext cx="0" cy="0"/>
+          <a:chOff x="0" y="0"/>
+          <a:chExt cx="0" cy="0"/>
+        </a:xfrm>
+      </p:grpSpPr>
+      <p:sp>
+        <p:nvSpPr>
           <p:cNvPr id="2" name="Title 1"/>
           <p:cNvSpPr>
             <a:spLocks noGrp="1"/>
@@ -7038,11 +8073,6 @@
               </a:rPr>
               <a:t>The calibration results are shown on the left side.</a:t>
             </a:r>
-            <a:endParaRPr lang="en-US" sz="1800" dirty="0" smtClean="0">
-              <a:solidFill>
-                <a:srgbClr val="00B050"/>
-              </a:solidFill>
-            </a:endParaRPr>
           </a:p>
           <a:p>
             <a:pPr>
@@ -7055,31 +8085,7 @@
                   <a:srgbClr val="FF0000"/>
                 </a:solidFill>
               </a:rPr>
-              <a:t>Select </a:t>
-            </a:r>
-            <a:r>
-              <a:rPr lang="en-US" sz="1800" dirty="0" smtClean="0">
-                <a:solidFill>
-                  <a:srgbClr val="FF0000"/>
-                </a:solidFill>
-              </a:rPr>
-              <a:t>“Show all devices” </a:t>
-            </a:r>
-            <a:r>
-              <a:rPr lang="en-US" sz="1800" dirty="0" smtClean="0">
-                <a:solidFill>
-                  <a:srgbClr val="FF0000"/>
-                </a:solidFill>
-              </a:rPr>
-              <a:t>to </a:t>
-            </a:r>
-            <a:r>
-              <a:rPr lang="en-US" sz="1800" dirty="0" smtClean="0">
-                <a:solidFill>
-                  <a:srgbClr val="FF0000"/>
-                </a:solidFill>
-              </a:rPr>
-              <a:t>view the simulation results</a:t>
+              <a:t>Select “Show all devices” to view the simulation results</a:t>
             </a:r>
             <a:endParaRPr lang="en-US" sz="1800" dirty="0">
               <a:solidFill>
@@ -7660,20 +8666,6 @@
               </a:rPr>
               <a:t>Good Calibration</a:t>
             </a:r>
-            <a:endParaRPr kumimoji="0" lang="en-US" sz="1400" b="1" i="0" u="none" strike="noStrike" kern="1200" cap="none" spc="0" normalizeH="0" baseline="0" noProof="0" dirty="0" smtClean="0">
-              <a:ln>
-                <a:noFill/>
-              </a:ln>
-              <a:solidFill>
-                <a:srgbClr val="00B0F0"/>
-              </a:solidFill>
-              <a:effectLst/>
-              <a:uLnTx/>
-              <a:uFillTx/>
-              <a:latin typeface="+mn-lt"/>
-              <a:ea typeface="+mn-ea"/>
-              <a:cs typeface="+mn-cs"/>
-            </a:endParaRPr>
           </a:p>
         </p:txBody>
       </p:sp>
@@ -7735,20 +8727,6 @@
               </a:rPr>
               <a:t>Bad Calibration</a:t>
             </a:r>
-            <a:endParaRPr kumimoji="0" lang="en-US" sz="1400" b="1" i="0" u="none" strike="noStrike" kern="1200" cap="none" spc="0" normalizeH="0" baseline="0" noProof="0" dirty="0" smtClean="0">
-              <a:ln>
-                <a:noFill/>
-              </a:ln>
-              <a:solidFill>
-                <a:srgbClr val="00B0F0"/>
-              </a:solidFill>
-              <a:effectLst/>
-              <a:uLnTx/>
-              <a:uFillTx/>
-              <a:latin typeface="+mn-lt"/>
-              <a:ea typeface="+mn-ea"/>
-              <a:cs typeface="+mn-cs"/>
-            </a:endParaRPr>
           </a:p>
         </p:txBody>
       </p:sp>

</xml_diff>